<commit_message>
DB class, error_log func,....
</commit_message>
<xml_diff>
--- a/Documents/VTP.pptx
+++ b/Documents/VTP.pptx
@@ -10,12 +10,14 @@
     <p:sldId id="268" r:id="rId4"/>
     <p:sldId id="258" r:id="rId5"/>
     <p:sldId id="259" r:id="rId6"/>
-    <p:sldId id="260" r:id="rId7"/>
-    <p:sldId id="261" r:id="rId8"/>
+    <p:sldId id="261" r:id="rId7"/>
+    <p:sldId id="260" r:id="rId8"/>
     <p:sldId id="263" r:id="rId9"/>
-    <p:sldId id="265" r:id="rId10"/>
-    <p:sldId id="266" r:id="rId11"/>
-    <p:sldId id="267" r:id="rId12"/>
+    <p:sldId id="270" r:id="rId10"/>
+    <p:sldId id="269" r:id="rId11"/>
+    <p:sldId id="265" r:id="rId12"/>
+    <p:sldId id="266" r:id="rId13"/>
+    <p:sldId id="267" r:id="rId14"/>
   </p:sldIdLst>
   <p:sldSz cx="9144000" cy="6858000" type="screen4x3"/>
   <p:notesSz cx="6858000" cy="9144000"/>
@@ -742,7 +744,7 @@
           <a:p>
             <a:fld id="{D240D384-88C0-445D-BC6D-D81CB357284F}" type="datetimeFigureOut">
               <a:rPr lang="en-US" smtClean="0"/>
-              <a:t>10/7/2012</a:t>
+              <a:t>10/9/2012</a:t>
             </a:fld>
             <a:endParaRPr lang="en-US" dirty="0"/>
           </a:p>
@@ -938,7 +940,7 @@
           <a:p>
             <a:fld id="{D240D384-88C0-445D-BC6D-D81CB357284F}" type="datetimeFigureOut">
               <a:rPr lang="en-US" smtClean="0"/>
-              <a:t>10/7/2012</a:t>
+              <a:t>10/9/2012</a:t>
             </a:fld>
             <a:endParaRPr lang="en-US" dirty="0"/>
           </a:p>
@@ -1123,7 +1125,7 @@
           <a:p>
             <a:fld id="{D240D384-88C0-445D-BC6D-D81CB357284F}" type="datetimeFigureOut">
               <a:rPr lang="en-US" smtClean="0"/>
-              <a:t>10/7/2012</a:t>
+              <a:t>10/9/2012</a:t>
             </a:fld>
             <a:endParaRPr lang="en-US" dirty="0"/>
           </a:p>
@@ -1273,7 +1275,7 @@
           <a:p>
             <a:fld id="{D240D384-88C0-445D-BC6D-D81CB357284F}" type="datetimeFigureOut">
               <a:rPr lang="en-US" smtClean="0"/>
-              <a:t>10/7/2012</a:t>
+              <a:t>10/9/2012</a:t>
             </a:fld>
             <a:endParaRPr lang="en-US" dirty="0"/>
           </a:p>
@@ -1528,7 +1530,7 @@
           <a:p>
             <a:fld id="{D240D384-88C0-445D-BC6D-D81CB357284F}" type="datetimeFigureOut">
               <a:rPr lang="en-US" smtClean="0"/>
-              <a:t>10/7/2012</a:t>
+              <a:t>10/9/2012</a:t>
             </a:fld>
             <a:endParaRPr lang="en-US" dirty="0"/>
           </a:p>
@@ -1937,7 +1939,7 @@
           <a:p>
             <a:fld id="{D240D384-88C0-445D-BC6D-D81CB357284F}" type="datetimeFigureOut">
               <a:rPr lang="en-US" smtClean="0"/>
-              <a:t>10/7/2012</a:t>
+              <a:t>10/9/2012</a:t>
             </a:fld>
             <a:endParaRPr lang="en-US" dirty="0"/>
           </a:p>
@@ -2383,7 +2385,7 @@
           <a:p>
             <a:fld id="{D240D384-88C0-445D-BC6D-D81CB357284F}" type="datetimeFigureOut">
               <a:rPr lang="en-US" smtClean="0"/>
-              <a:t>10/7/2012</a:t>
+              <a:t>10/9/2012</a:t>
             </a:fld>
             <a:endParaRPr lang="en-US" dirty="0"/>
           </a:p>
@@ -2484,7 +2486,7 @@
           <a:p>
             <a:fld id="{D240D384-88C0-445D-BC6D-D81CB357284F}" type="datetimeFigureOut">
               <a:rPr lang="en-US" smtClean="0"/>
-              <a:t>10/7/2012</a:t>
+              <a:t>10/9/2012</a:t>
             </a:fld>
             <a:endParaRPr lang="en-US" dirty="0"/>
           </a:p>
@@ -2605,7 +2607,7 @@
           <a:p>
             <a:fld id="{D240D384-88C0-445D-BC6D-D81CB357284F}" type="datetimeFigureOut">
               <a:rPr lang="en-US" smtClean="0"/>
-              <a:t>10/7/2012</a:t>
+              <a:t>10/9/2012</a:t>
             </a:fld>
             <a:endParaRPr lang="en-US" dirty="0"/>
           </a:p>
@@ -2879,7 +2881,7 @@
           <a:p>
             <a:fld id="{D240D384-88C0-445D-BC6D-D81CB357284F}" type="datetimeFigureOut">
               <a:rPr lang="en-US" smtClean="0"/>
-              <a:t>10/7/2012</a:t>
+              <a:t>10/9/2012</a:t>
             </a:fld>
             <a:endParaRPr lang="en-US" dirty="0"/>
           </a:p>
@@ -3084,7 +3086,7 @@
           <a:p>
             <a:fld id="{D240D384-88C0-445D-BC6D-D81CB357284F}" type="datetimeFigureOut">
               <a:rPr lang="en-US" smtClean="0"/>
-              <a:t>10/7/2012</a:t>
+              <a:t>10/9/2012</a:t>
             </a:fld>
             <a:endParaRPr lang="en-US" dirty="0"/>
           </a:p>
@@ -4193,7 +4195,7 @@
           <a:p>
             <a:fld id="{D240D384-88C0-445D-BC6D-D81CB357284F}" type="datetimeFigureOut">
               <a:rPr lang="en-US" smtClean="0"/>
-              <a:t>10/7/2012</a:t>
+              <a:t>10/9/2012</a:t>
             </a:fld>
             <a:endParaRPr lang="en-US" dirty="0"/>
           </a:p>
@@ -4763,6 +4765,96 @@
       </p:grpSpPr>
       <p:sp>
         <p:nvSpPr>
+          <p:cNvPr id="2" name="Content Placeholder 1"/>
+          <p:cNvSpPr>
+            <a:spLocks noGrp="1"/>
+          </p:cNvSpPr>
+          <p:nvPr>
+            <p:ph idx="1"/>
+          </p:nvPr>
+        </p:nvSpPr>
+        <p:spPr/>
+        <p:txBody>
+          <a:bodyPr/>
+          <a:lstStyle/>
+          <a:p>
+            <a:r>
+              <a:rPr lang="en-US" dirty="0" smtClean="0"/>
+              <a:t>Database</a:t>
+            </a:r>
+          </a:p>
+          <a:p>
+            <a:r>
+              <a:rPr lang="en-US" dirty="0" smtClean="0"/>
+              <a:t>Unit Testing</a:t>
+            </a:r>
+          </a:p>
+          <a:p>
+            <a:r>
+              <a:rPr lang="en-US" dirty="0" smtClean="0"/>
+              <a:t>Integration Test</a:t>
+            </a:r>
+            <a:endParaRPr lang="en-US" dirty="0"/>
+          </a:p>
+        </p:txBody>
+      </p:sp>
+      <p:sp>
+        <p:nvSpPr>
+          <p:cNvPr id="3" name="Title 2"/>
+          <p:cNvSpPr>
+            <a:spLocks noGrp="1"/>
+          </p:cNvSpPr>
+          <p:nvPr>
+            <p:ph type="title"/>
+          </p:nvPr>
+        </p:nvSpPr>
+        <p:spPr/>
+        <p:txBody>
+          <a:bodyPr>
+            <a:normAutofit/>
+          </a:bodyPr>
+          <a:lstStyle/>
+          <a:p>
+            <a:r>
+              <a:rPr lang="en-US" dirty="0" smtClean="0"/>
+              <a:t>Testing</a:t>
+            </a:r>
+            <a:endParaRPr lang="en-US" dirty="0"/>
+          </a:p>
+        </p:txBody>
+      </p:sp>
+    </p:spTree>
+    <p:extLst>
+      <p:ext uri="{BB962C8B-B14F-4D97-AF65-F5344CB8AC3E}">
+        <p14:creationId xmlns:p14="http://schemas.microsoft.com/office/powerpoint/2010/main" val="182815467"/>
+      </p:ext>
+    </p:extLst>
+  </p:cSld>
+  <p:clrMapOvr>
+    <a:masterClrMapping/>
+  </p:clrMapOvr>
+</p:sld>
+</file>
+
+<file path=ppt/slides/slide11.xml><?xml version="1.0" encoding="utf-8"?>
+<p:sld xmlns:a="http://schemas.openxmlformats.org/drawingml/2006/main" xmlns:r="http://schemas.openxmlformats.org/officeDocument/2006/relationships" xmlns:p="http://schemas.openxmlformats.org/presentationml/2006/main">
+  <p:cSld>
+    <p:spTree>
+      <p:nvGrpSpPr>
+        <p:cNvPr id="1" name=""/>
+        <p:cNvGrpSpPr/>
+        <p:nvPr/>
+      </p:nvGrpSpPr>
+      <p:grpSpPr>
+        <a:xfrm>
+          <a:off x="0" y="0"/>
+          <a:ext cx="0" cy="0"/>
+          <a:chOff x="0" y="0"/>
+          <a:chExt cx="0" cy="0"/>
+        </a:xfrm>
+      </p:grpSpPr>
+      <p:sp>
+        <p:nvSpPr>
           <p:cNvPr id="3" name="Content Placeholder 2"/>
           <p:cNvSpPr>
             <a:spLocks noGrp="1"/>
@@ -4775,6 +4867,192 @@
         <p:txBody>
           <a:bodyPr/>
           <a:lstStyle/>
+          <a:p>
+            <a:r>
+              <a:rPr lang="en-US" dirty="0" smtClean="0"/>
+              <a:t>Sprints I:</a:t>
+            </a:r>
+          </a:p>
+          <a:p>
+            <a:pPr lvl="1"/>
+            <a:r>
+              <a:rPr lang="en-US" dirty="0" smtClean="0"/>
+              <a:t>Initial Requirements Document.</a:t>
+            </a:r>
+          </a:p>
+          <a:p>
+            <a:pPr lvl="1"/>
+            <a:r>
+              <a:rPr lang="en-US" dirty="0" smtClean="0"/>
+              <a:t>Research on supported platforms</a:t>
+            </a:r>
+          </a:p>
+          <a:p>
+            <a:pPr lvl="2"/>
+            <a:r>
+              <a:rPr lang="en-US" dirty="0" err="1" smtClean="0"/>
+              <a:t>Youtube</a:t>
+            </a:r>
+            <a:r>
+              <a:rPr lang="en-US" dirty="0" smtClean="0"/>
+              <a:t>, </a:t>
+            </a:r>
+            <a:r>
+              <a:rPr lang="en-US" dirty="0" err="1" smtClean="0"/>
+              <a:t>Viemo</a:t>
+            </a:r>
+            <a:endParaRPr lang="en-US" dirty="0" smtClean="0"/>
+          </a:p>
+          <a:p>
+            <a:pPr lvl="1"/>
+            <a:r>
+              <a:rPr lang="en-US" dirty="0" smtClean="0"/>
+              <a:t>Prototype</a:t>
+            </a:r>
+          </a:p>
+          <a:p>
+            <a:pPr lvl="1"/>
+            <a:endParaRPr lang="en-US" dirty="0" smtClean="0"/>
+          </a:p>
+          <a:p>
+            <a:r>
+              <a:rPr lang="en-US" dirty="0" smtClean="0"/>
+              <a:t>Sprint II:</a:t>
+            </a:r>
+          </a:p>
+          <a:p>
+            <a:pPr lvl="1"/>
+            <a:r>
+              <a:rPr lang="en-US" dirty="0" smtClean="0"/>
+              <a:t>Host on a server.</a:t>
+            </a:r>
+          </a:p>
+          <a:p>
+            <a:pPr lvl="1"/>
+            <a:r>
+              <a:rPr lang="en-US" dirty="0" smtClean="0"/>
+              <a:t>Design Database.</a:t>
+            </a:r>
+          </a:p>
+          <a:p>
+            <a:pPr lvl="1"/>
+            <a:r>
+              <a:rPr lang="en-US" dirty="0" smtClean="0"/>
+              <a:t>Integrate Google/</a:t>
+            </a:r>
+            <a:r>
+              <a:rPr lang="en-US" dirty="0" err="1" smtClean="0"/>
+              <a:t>facebook</a:t>
+            </a:r>
+            <a:r>
+              <a:rPr lang="en-US" smtClean="0"/>
+              <a:t> accounts.</a:t>
+            </a:r>
+            <a:endParaRPr lang="en-US" dirty="0" smtClean="0"/>
+          </a:p>
+          <a:p>
+            <a:pPr lvl="1"/>
+            <a:r>
+              <a:rPr lang="en-US" dirty="0" smtClean="0"/>
+              <a:t>Automate tag display for videos.</a:t>
+            </a:r>
+            <a:endParaRPr lang="en-US" dirty="0" smtClean="0"/>
+          </a:p>
+          <a:p>
+            <a:pPr lvl="1"/>
+            <a:endParaRPr lang="en-US" dirty="0"/>
+          </a:p>
+        </p:txBody>
+      </p:sp>
+      <p:sp>
+        <p:nvSpPr>
+          <p:cNvPr id="2" name="Title 1"/>
+          <p:cNvSpPr>
+            <a:spLocks noGrp="1"/>
+          </p:cNvSpPr>
+          <p:nvPr>
+            <p:ph type="title"/>
+          </p:nvPr>
+        </p:nvSpPr>
+        <p:spPr/>
+        <p:txBody>
+          <a:bodyPr/>
+          <a:lstStyle/>
+          <a:p>
+            <a:r>
+              <a:rPr lang="en-US" dirty="0" smtClean="0"/>
+              <a:t>Gantt Plan</a:t>
+            </a:r>
+            <a:endParaRPr lang="en-US" dirty="0"/>
+          </a:p>
+        </p:txBody>
+      </p:sp>
+    </p:spTree>
+    <p:extLst>
+      <p:ext uri="{BB962C8B-B14F-4D97-AF65-F5344CB8AC3E}">
+        <p14:creationId xmlns:p14="http://schemas.microsoft.com/office/powerpoint/2010/main" val="3049208346"/>
+      </p:ext>
+    </p:extLst>
+  </p:cSld>
+  <p:clrMapOvr>
+    <a:masterClrMapping/>
+  </p:clrMapOvr>
+  <p:timing>
+    <p:tnLst>
+      <p:par>
+        <p:cTn id="1" dur="indefinite" restart="never" nodeType="tmRoot"/>
+      </p:par>
+    </p:tnLst>
+  </p:timing>
+</p:sld>
+</file>
+
+<file path=ppt/slides/slide12.xml><?xml version="1.0" encoding="utf-8"?>
+<p:sld xmlns:a="http://schemas.openxmlformats.org/drawingml/2006/main" xmlns:r="http://schemas.openxmlformats.org/officeDocument/2006/relationships" xmlns:p="http://schemas.openxmlformats.org/presentationml/2006/main">
+  <p:cSld>
+    <p:spTree>
+      <p:nvGrpSpPr>
+        <p:cNvPr id="1" name=""/>
+        <p:cNvGrpSpPr/>
+        <p:nvPr/>
+      </p:nvGrpSpPr>
+      <p:grpSpPr>
+        <a:xfrm>
+          <a:off x="0" y="0"/>
+          <a:ext cx="0" cy="0"/>
+          <a:chOff x="0" y="0"/>
+          <a:chExt cx="0" cy="0"/>
+        </a:xfrm>
+      </p:grpSpPr>
+      <p:sp>
+        <p:nvSpPr>
+          <p:cNvPr id="3" name="Content Placeholder 2"/>
+          <p:cNvSpPr>
+            <a:spLocks noGrp="1"/>
+          </p:cNvSpPr>
+          <p:nvPr>
+            <p:ph idx="1"/>
+          </p:nvPr>
+        </p:nvSpPr>
+        <p:spPr/>
+        <p:txBody>
+          <a:bodyPr/>
+          <a:lstStyle/>
+          <a:p>
+            <a:r>
+              <a:rPr lang="en-US" dirty="0" smtClean="0"/>
+              <a:t>Sprint Reports</a:t>
+            </a:r>
+          </a:p>
+          <a:p>
+            <a:endParaRPr lang="en-US" dirty="0" smtClean="0"/>
+          </a:p>
+          <a:p>
+            <a:r>
+              <a:rPr lang="en-US" dirty="0" smtClean="0"/>
+              <a:t>System Requirements Document</a:t>
+            </a:r>
+          </a:p>
           <a:p>
             <a:endParaRPr lang="en-US" dirty="0"/>
           </a:p>
@@ -4823,7 +5101,7 @@
 </p:sld>
 </file>
 
-<file path=ppt/slides/slide11.xml><?xml version="1.0" encoding="utf-8"?>
+<file path=ppt/slides/slide13.xml><?xml version="1.0" encoding="utf-8"?>
 <p:sld xmlns:a="http://schemas.openxmlformats.org/drawingml/2006/main" xmlns:r="http://schemas.openxmlformats.org/officeDocument/2006/relationships" xmlns:p="http://schemas.openxmlformats.org/presentationml/2006/main">
   <p:cSld>
     <p:spTree>
@@ -5309,31 +5587,45 @@
           <a:lstStyle/>
           <a:p>
             <a:r>
+              <a:rPr lang="en-US" dirty="0">
+                <a:hlinkClick r:id="rId2"/>
+              </a:rPr>
+              <a:t>http://localhost/local/vtp</a:t>
+            </a:r>
+            <a:r>
+              <a:rPr lang="en-US" dirty="0" smtClean="0">
+                <a:hlinkClick r:id="rId2"/>
+              </a:rPr>
+              <a:t>/</a:t>
+            </a:r>
+            <a:endParaRPr lang="en-US" dirty="0" smtClean="0"/>
+          </a:p>
+          <a:p>
+            <a:pPr marL="109728" indent="0">
+              <a:buNone/>
+            </a:pPr>
+            <a:endParaRPr lang="en-US" dirty="0"/>
+          </a:p>
+        </p:txBody>
+      </p:sp>
+      <p:sp>
+        <p:nvSpPr>
+          <p:cNvPr id="2" name="Title 1"/>
+          <p:cNvSpPr>
+            <a:spLocks noGrp="1"/>
+          </p:cNvSpPr>
+          <p:nvPr>
+            <p:ph type="title"/>
+          </p:nvPr>
+        </p:nvSpPr>
+        <p:spPr/>
+        <p:txBody>
+          <a:bodyPr/>
+          <a:lstStyle/>
+          <a:p>
+            <a:r>
               <a:rPr lang="en-US" dirty="0" smtClean="0"/>
-              <a:t>Architecture</a:t>
-            </a:r>
-            <a:endParaRPr lang="en-US" dirty="0"/>
-          </a:p>
-        </p:txBody>
-      </p:sp>
-      <p:sp>
-        <p:nvSpPr>
-          <p:cNvPr id="2" name="Title 1"/>
-          <p:cNvSpPr>
-            <a:spLocks noGrp="1"/>
-          </p:cNvSpPr>
-          <p:nvPr>
-            <p:ph type="title"/>
-          </p:nvPr>
-        </p:nvSpPr>
-        <p:spPr/>
-        <p:txBody>
-          <a:bodyPr/>
-          <a:lstStyle/>
-          <a:p>
-            <a:r>
-              <a:rPr lang="en-US" dirty="0" smtClean="0"/>
-              <a:t>Design</a:t>
+              <a:t>Prototype</a:t>
             </a:r>
             <a:endParaRPr lang="en-US" dirty="0"/>
           </a:p>
@@ -5342,7 +5634,7 @@
     </p:spTree>
     <p:extLst>
       <p:ext uri="{BB962C8B-B14F-4D97-AF65-F5344CB8AC3E}">
-        <p14:creationId xmlns:p14="http://schemas.microsoft.com/office/powerpoint/2010/main" val="292114244"/>
+        <p14:creationId xmlns:p14="http://schemas.microsoft.com/office/powerpoint/2010/main" val="24025467"/>
       </p:ext>
     </p:extLst>
   </p:cSld>
@@ -5392,10 +5684,46 @@
           <a:lstStyle/>
           <a:p>
             <a:r>
-              <a:rPr lang="en-US" dirty="0">
-                <a:hlinkClick r:id="rId2"/>
-              </a:rPr>
-              <a:t>http://dev.mcs.sdsmt.edu/~1919065/VTP/VTP/</a:t>
+              <a:rPr lang="en-US" dirty="0" smtClean="0"/>
+              <a:t>Languages: PHP, HTML 5, CSS, MySQL, </a:t>
+            </a:r>
+            <a:r>
+              <a:rPr lang="en-US" dirty="0" err="1" smtClean="0"/>
+              <a:t>JavaScipt</a:t>
+            </a:r>
+            <a:r>
+              <a:rPr lang="en-US" dirty="0" smtClean="0"/>
+              <a:t> </a:t>
+            </a:r>
+          </a:p>
+          <a:p>
+            <a:endParaRPr lang="en-US" dirty="0" smtClean="0"/>
+          </a:p>
+          <a:p>
+            <a:r>
+              <a:rPr lang="en-US" dirty="0" smtClean="0"/>
+              <a:t>Architecture</a:t>
+            </a:r>
+          </a:p>
+          <a:p>
+            <a:pPr lvl="1"/>
+            <a:r>
+              <a:rPr lang="en-US" dirty="0" smtClean="0"/>
+              <a:t>Account Management</a:t>
+            </a:r>
+          </a:p>
+          <a:p>
+            <a:pPr lvl="1"/>
+            <a:r>
+              <a:rPr lang="en-US" dirty="0" smtClean="0"/>
+              <a:t>Photo Library</a:t>
+            </a:r>
+          </a:p>
+          <a:p>
+            <a:pPr lvl="1"/>
+            <a:r>
+              <a:rPr lang="en-US" dirty="0" smtClean="0"/>
+              <a:t>Database Management</a:t>
             </a:r>
             <a:endParaRPr lang="en-US" dirty="0"/>
           </a:p>
@@ -5418,7 +5746,7 @@
           <a:p>
             <a:r>
               <a:rPr lang="en-US" dirty="0" smtClean="0"/>
-              <a:t>Prototype</a:t>
+              <a:t>Design</a:t>
             </a:r>
             <a:endParaRPr lang="en-US" dirty="0"/>
           </a:p>
@@ -5427,7 +5755,7 @@
     </p:spTree>
     <p:extLst>
       <p:ext uri="{BB962C8B-B14F-4D97-AF65-F5344CB8AC3E}">
-        <p14:creationId xmlns:p14="http://schemas.microsoft.com/office/powerpoint/2010/main" val="24025467"/>
+        <p14:creationId xmlns:p14="http://schemas.microsoft.com/office/powerpoint/2010/main" val="292114244"/>
       </p:ext>
     </p:extLst>
   </p:cSld>
@@ -5478,8 +5806,28 @@
           <a:p>
             <a:r>
               <a:rPr lang="en-US" dirty="0" smtClean="0"/>
-              <a:t>Risk Analysis</a:t>
-            </a:r>
+              <a:t>Risk </a:t>
+            </a:r>
+            <a:r>
+              <a:rPr lang="en-US" dirty="0" smtClean="0"/>
+              <a:t>Analysis</a:t>
+            </a:r>
+          </a:p>
+          <a:p>
+            <a:pPr lvl="1"/>
+            <a:r>
+              <a:rPr lang="en-US" dirty="0" smtClean="0"/>
+              <a:t>Flash </a:t>
+            </a:r>
+            <a:r>
+              <a:rPr lang="en-US" dirty="0" err="1" smtClean="0"/>
+              <a:t>Vs</a:t>
+            </a:r>
+            <a:r>
+              <a:rPr lang="en-US" dirty="0" smtClean="0"/>
+              <a:t> HTML 5</a:t>
+            </a:r>
+            <a:endParaRPr lang="en-US" dirty="0" smtClean="0"/>
           </a:p>
           <a:p>
             <a:endParaRPr lang="en-US" dirty="0"/>
@@ -5487,8 +5835,15 @@
           <a:p>
             <a:r>
               <a:rPr lang="en-US" dirty="0" smtClean="0"/>
-              <a:t>Contingency Plan</a:t>
-            </a:r>
+              <a:t>Contingency </a:t>
+            </a:r>
+            <a:r>
+              <a:rPr lang="en-US" dirty="0" smtClean="0"/>
+              <a:t>Plan</a:t>
+            </a:r>
+          </a:p>
+          <a:p>
+            <a:pPr lvl="1"/>
             <a:endParaRPr lang="en-US" dirty="0"/>
           </a:p>
         </p:txBody>
@@ -5555,7 +5910,7 @@
       </p:grpSpPr>
       <p:sp>
         <p:nvSpPr>
-          <p:cNvPr id="3" name="Content Placeholder 2"/>
+          <p:cNvPr id="2" name="Content Placeholder 1"/>
           <p:cNvSpPr>
             <a:spLocks noGrp="1"/>
           </p:cNvSpPr>
@@ -5570,7 +5925,19 @@
           <a:p>
             <a:r>
               <a:rPr lang="en-US" dirty="0" smtClean="0"/>
-              <a:t>Sprints</a:t>
+              <a:t>Expenses to host and maintain the website.</a:t>
+            </a:r>
+          </a:p>
+          <a:p>
+            <a:r>
+              <a:rPr lang="en-US" dirty="0" smtClean="0"/>
+              <a:t>All materials used in the development are free to use</a:t>
+            </a:r>
+          </a:p>
+          <a:p>
+            <a:r>
+              <a:rPr lang="en-US" dirty="0" smtClean="0"/>
+              <a:t>Our only cost to develop is our time</a:t>
             </a:r>
             <a:endParaRPr lang="en-US" dirty="0"/>
           </a:p>
@@ -5578,7 +5945,7 @@
       </p:sp>
       <p:sp>
         <p:nvSpPr>
-          <p:cNvPr id="2" name="Title 1"/>
+          <p:cNvPr id="3" name="Title 2"/>
           <p:cNvSpPr>
             <a:spLocks noGrp="1"/>
           </p:cNvSpPr>
@@ -5588,12 +5955,14 @@
         </p:nvSpPr>
         <p:spPr/>
         <p:txBody>
-          <a:bodyPr/>
+          <a:bodyPr>
+            <a:normAutofit/>
+          </a:bodyPr>
           <a:lstStyle/>
           <a:p>
             <a:r>
               <a:rPr lang="en-US" dirty="0" smtClean="0"/>
-              <a:t>Gantt Plan</a:t>
+              <a:t>Budget</a:t>
             </a:r>
             <a:endParaRPr lang="en-US" dirty="0"/>
           </a:p>
@@ -5602,20 +5971,13 @@
     </p:spTree>
     <p:extLst>
       <p:ext uri="{BB962C8B-B14F-4D97-AF65-F5344CB8AC3E}">
-        <p14:creationId xmlns:p14="http://schemas.microsoft.com/office/powerpoint/2010/main" val="3049208346"/>
+        <p14:creationId xmlns:p14="http://schemas.microsoft.com/office/powerpoint/2010/main" val="3138907883"/>
       </p:ext>
     </p:extLst>
   </p:cSld>
   <p:clrMapOvr>
     <a:masterClrMapping/>
   </p:clrMapOvr>
-  <p:timing>
-    <p:tnLst>
-      <p:par>
-        <p:cTn id="1" dur="indefinite" restart="never" nodeType="tmRoot"/>
-      </p:par>
-    </p:tnLst>
-  </p:timing>
 </p:sld>
 </file>
 

</xml_diff>